<commit_message>
Adding in some resources and links to tutorials
</commit_message>
<xml_diff>
--- a/Lab02/ReproducibleResearch.pptx
+++ b/Lab02/ReproducibleResearch.pptx
@@ -5,10 +5,10 @@
     <p:sldMasterId id="2147483660" r:id="rId1"/>
   </p:sldMasterIdLst>
   <p:notesMasterIdLst>
-    <p:notesMasterId r:id="rId12"/>
+    <p:notesMasterId r:id="rId11"/>
   </p:notesMasterIdLst>
   <p:handoutMasterIdLst>
-    <p:handoutMasterId r:id="rId13"/>
+    <p:handoutMasterId r:id="rId12"/>
   </p:handoutMasterIdLst>
   <p:sldIdLst>
     <p:sldId id="1180" r:id="rId2"/>
@@ -20,7 +20,6 @@
     <p:sldId id="1202" r:id="rId8"/>
     <p:sldId id="1211" r:id="rId9"/>
     <p:sldId id="1212" r:id="rId10"/>
-    <p:sldId id="1210" r:id="rId11"/>
   </p:sldIdLst>
   <p:sldSz cx="9144000" cy="5143500" type="screen16x9"/>
   <p:notesSz cx="6858000" cy="9144000"/>
@@ -236,7 +235,7 @@
           <a:p>
             <a:fld id="{E5B76C65-64D1-A346-B002-675E85196D99}" type="datetimeFigureOut">
               <a:rPr lang="en-US" smtClean="0"/>
-              <a:t>9/27/2021</a:t>
+              <a:t>10/4/2021</a:t>
             </a:fld>
             <a:endParaRPr lang="en-US"/>
           </a:p>
@@ -413,7 +412,7 @@
           <a:p>
             <a:fld id="{59D4CC12-7D1D-5E44-BEE2-A246CA2F43AE}" type="datetimeFigureOut">
               <a:rPr lang="en-US" smtClean="0"/>
-              <a:t>9/27/2021</a:t>
+              <a:t>10/4/2021</a:t>
             </a:fld>
             <a:endParaRPr lang="en-US"/>
           </a:p>
@@ -2869,269 +2868,6 @@
 </p:sld>
 </file>
 
-<file path=ppt/slides/slide10.xml><?xml version="1.0" encoding="utf-8"?>
-<p:sld xmlns:a="http://schemas.openxmlformats.org/drawingml/2006/main" xmlns:r="http://schemas.openxmlformats.org/officeDocument/2006/relationships" xmlns:p="http://schemas.openxmlformats.org/presentationml/2006/main">
-  <p:cSld>
-    <p:spTree>
-      <p:nvGrpSpPr>
-        <p:cNvPr id="1" name=""/>
-        <p:cNvGrpSpPr/>
-        <p:nvPr/>
-      </p:nvGrpSpPr>
-      <p:grpSpPr>
-        <a:xfrm>
-          <a:off x="0" y="0"/>
-          <a:ext cx="0" cy="0"/>
-          <a:chOff x="0" y="0"/>
-          <a:chExt cx="0" cy="0"/>
-        </a:xfrm>
-      </p:grpSpPr>
-      <p:sp>
-        <p:nvSpPr>
-          <p:cNvPr id="2" name="Title 1"/>
-          <p:cNvSpPr>
-            <a:spLocks noGrp="1"/>
-          </p:cNvSpPr>
-          <p:nvPr>
-            <p:ph type="title"/>
-          </p:nvPr>
-        </p:nvSpPr>
-        <p:spPr/>
-        <p:txBody>
-          <a:bodyPr>
-            <a:normAutofit/>
-          </a:bodyPr>
-          <a:lstStyle/>
-          <a:p>
-            <a:r>
-              <a:rPr lang="en-US" dirty="0" smtClean="0"/>
-              <a:t>Tips and Resources</a:t>
-            </a:r>
-            <a:endParaRPr lang="en-US" dirty="0"/>
-          </a:p>
-        </p:txBody>
-      </p:sp>
-      <p:sp>
-        <p:nvSpPr>
-          <p:cNvPr id="3" name="Content Placeholder 2"/>
-          <p:cNvSpPr>
-            <a:spLocks noGrp="1"/>
-          </p:cNvSpPr>
-          <p:nvPr>
-            <p:ph idx="1"/>
-          </p:nvPr>
-        </p:nvSpPr>
-        <p:spPr/>
-        <p:txBody>
-          <a:bodyPr>
-            <a:normAutofit fontScale="85000" lnSpcReduction="20000"/>
-          </a:bodyPr>
-          <a:lstStyle/>
-          <a:p>
-            <a:pPr marL="0" indent="0" fontAlgn="base">
-              <a:lnSpc>
-                <a:spcPct val="110000"/>
-              </a:lnSpc>
-              <a:buNone/>
-            </a:pPr>
-            <a:r>
-              <a:rPr lang="en-US" dirty="0" smtClean="0">
-                <a:solidFill>
-                  <a:schemeClr val="tx2"/>
-                </a:solidFill>
-              </a:rPr>
-              <a:t>Online book: R for Data Science</a:t>
-            </a:r>
-          </a:p>
-          <a:p>
-            <a:pPr marL="0" indent="0" fontAlgn="base">
-              <a:lnSpc>
-                <a:spcPct val="110000"/>
-              </a:lnSpc>
-              <a:buNone/>
-            </a:pPr>
-            <a:r>
-              <a:rPr lang="en-US" dirty="0">
-                <a:solidFill>
-                  <a:schemeClr val="tx2"/>
-                </a:solidFill>
-                <a:hlinkClick r:id="rId2"/>
-              </a:rPr>
-              <a:t>https://r4ds.had.co.nz</a:t>
-            </a:r>
-            <a:r>
-              <a:rPr lang="en-US" dirty="0" smtClean="0">
-                <a:solidFill>
-                  <a:schemeClr val="tx2"/>
-                </a:solidFill>
-                <a:hlinkClick r:id="rId2"/>
-              </a:rPr>
-              <a:t>/</a:t>
-            </a:r>
-            <a:endParaRPr lang="en-US" dirty="0" smtClean="0">
-              <a:solidFill>
-                <a:schemeClr val="tx2"/>
-              </a:solidFill>
-            </a:endParaRPr>
-          </a:p>
-          <a:p>
-            <a:pPr marL="0" indent="0" fontAlgn="base">
-              <a:lnSpc>
-                <a:spcPct val="110000"/>
-              </a:lnSpc>
-              <a:buNone/>
-            </a:pPr>
-            <a:r>
-              <a:rPr lang="en-US" dirty="0" smtClean="0">
-                <a:solidFill>
-                  <a:schemeClr val="tx2"/>
-                </a:solidFill>
-              </a:rPr>
-              <a:t>Uses the </a:t>
-            </a:r>
-            <a:r>
-              <a:rPr lang="en-US" dirty="0" err="1" smtClean="0">
-                <a:solidFill>
-                  <a:schemeClr val="tx2"/>
-                </a:solidFill>
-              </a:rPr>
-              <a:t>tidyverse</a:t>
-            </a:r>
-            <a:r>
-              <a:rPr lang="en-US" dirty="0" smtClean="0">
-                <a:solidFill>
-                  <a:schemeClr val="tx2"/>
-                </a:solidFill>
-              </a:rPr>
-              <a:t> packages (includes ggplot2)</a:t>
-            </a:r>
-          </a:p>
-          <a:p>
-            <a:pPr marL="0" indent="0" fontAlgn="base">
-              <a:lnSpc>
-                <a:spcPct val="110000"/>
-              </a:lnSpc>
-              <a:buNone/>
-            </a:pPr>
-            <a:endParaRPr lang="en-US" dirty="0">
-              <a:solidFill>
-                <a:schemeClr val="tx2"/>
-              </a:solidFill>
-            </a:endParaRPr>
-          </a:p>
-          <a:p>
-            <a:pPr marL="0" indent="0" fontAlgn="base">
-              <a:lnSpc>
-                <a:spcPct val="110000"/>
-              </a:lnSpc>
-              <a:buNone/>
-            </a:pPr>
-            <a:r>
-              <a:rPr lang="en-US" dirty="0" smtClean="0">
-                <a:solidFill>
-                  <a:schemeClr val="tx2"/>
-                </a:solidFill>
-              </a:rPr>
-              <a:t>Beginner R courses:</a:t>
-            </a:r>
-          </a:p>
-          <a:p>
-            <a:pPr marL="0" indent="0" fontAlgn="base">
-              <a:lnSpc>
-                <a:spcPct val="110000"/>
-              </a:lnSpc>
-              <a:buNone/>
-            </a:pPr>
-            <a:r>
-              <a:rPr lang="en-US" dirty="0">
-                <a:solidFill>
-                  <a:schemeClr val="tx2"/>
-                </a:solidFill>
-                <a:hlinkClick r:id="rId3"/>
-              </a:rPr>
-              <a:t>http://swcarpentry.github.io/r-novice-gapminder</a:t>
-            </a:r>
-            <a:r>
-              <a:rPr lang="en-US" dirty="0" smtClean="0">
-                <a:solidFill>
-                  <a:schemeClr val="tx2"/>
-                </a:solidFill>
-                <a:hlinkClick r:id="rId3"/>
-              </a:rPr>
-              <a:t>/</a:t>
-            </a:r>
-            <a:endParaRPr lang="en-US" dirty="0" smtClean="0">
-              <a:solidFill>
-                <a:schemeClr val="tx2"/>
-              </a:solidFill>
-            </a:endParaRPr>
-          </a:p>
-          <a:p>
-            <a:pPr marL="0" indent="0" fontAlgn="base">
-              <a:lnSpc>
-                <a:spcPct val="110000"/>
-              </a:lnSpc>
-              <a:buNone/>
-            </a:pPr>
-            <a:r>
-              <a:rPr lang="en-US" dirty="0">
-                <a:solidFill>
-                  <a:schemeClr val="tx2"/>
-                </a:solidFill>
-                <a:hlinkClick r:id="rId4"/>
-              </a:rPr>
-              <a:t>http://swcarpentry.github.io/r-novice-inflammation</a:t>
-            </a:r>
-            <a:r>
-              <a:rPr lang="en-US" dirty="0" smtClean="0">
-                <a:solidFill>
-                  <a:schemeClr val="tx2"/>
-                </a:solidFill>
-                <a:hlinkClick r:id="rId4"/>
-              </a:rPr>
-              <a:t>/</a:t>
-            </a:r>
-            <a:endParaRPr lang="en-US" dirty="0" smtClean="0">
-              <a:solidFill>
-                <a:schemeClr val="tx2"/>
-              </a:solidFill>
-            </a:endParaRPr>
-          </a:p>
-          <a:p>
-            <a:pPr marL="0" indent="0" fontAlgn="base">
-              <a:lnSpc>
-                <a:spcPct val="110000"/>
-              </a:lnSpc>
-              <a:buNone/>
-            </a:pPr>
-            <a:endParaRPr lang="en-US" dirty="0" smtClean="0">
-              <a:solidFill>
-                <a:schemeClr val="tx2"/>
-              </a:solidFill>
-            </a:endParaRPr>
-          </a:p>
-        </p:txBody>
-      </p:sp>
-    </p:spTree>
-    <p:extLst>
-      <p:ext uri="{BB962C8B-B14F-4D97-AF65-F5344CB8AC3E}">
-        <p14:creationId xmlns:p14="http://schemas.microsoft.com/office/powerpoint/2010/main" val="1895174421"/>
-      </p:ext>
-    </p:extLst>
-  </p:cSld>
-  <p:clrMapOvr>
-    <a:masterClrMapping/>
-  </p:clrMapOvr>
-  <p:timing>
-    <p:tnLst>
-      <p:par>
-        <p:cTn id="1" dur="indefinite" restart="never" nodeType="tmRoot"/>
-      </p:par>
-    </p:tnLst>
-  </p:timing>
-</p:sld>
-</file>
-
 <file path=ppt/slides/slide2.xml><?xml version="1.0" encoding="utf-8"?>
 <p:sld xmlns:a="http://schemas.openxmlformats.org/drawingml/2006/main" xmlns:r="http://schemas.openxmlformats.org/officeDocument/2006/relationships" xmlns:p="http://schemas.openxmlformats.org/presentationml/2006/main">
   <p:cSld>
@@ -3282,18 +3018,7 @@
                   </a:schemeClr>
                 </a:solidFill>
               </a:rPr>
-              <a:t>H</a:t>
-            </a:r>
-            <a:r>
-              <a:rPr lang="en-US" sz="1200" dirty="0">
-                <a:solidFill>
-                  <a:schemeClr val="tx2">
-                    <a:lumMod val="60000"/>
-                    <a:lumOff val="40000"/>
-                  </a:schemeClr>
-                </a:solidFill>
-              </a:rPr>
-              <a:t>ow are you going to analyze it?</a:t>
+              <a:t>How are you going to analyze it?</a:t>
             </a:r>
           </a:p>
           <a:p>
@@ -3892,15 +3617,7 @@
                   <a:schemeClr val="tx2"/>
                 </a:solidFill>
               </a:rPr>
-              <a:t>	</a:t>
-            </a:r>
-            <a:r>
-              <a:rPr lang="en-US" sz="1500" dirty="0">
-                <a:solidFill>
-                  <a:schemeClr val="tx2"/>
-                </a:solidFill>
-              </a:rPr>
-              <a:t>	</a:t>
+              <a:t>		</a:t>
             </a:r>
             <a:r>
               <a:rPr lang="en-US" sz="1500" dirty="0">
@@ -4015,15 +3732,7 @@
                   <a:schemeClr val="tx2"/>
                 </a:solidFill>
               </a:rPr>
-              <a:t>	</a:t>
-            </a:r>
-            <a:r>
-              <a:rPr lang="en-US" sz="600" dirty="0">
-                <a:solidFill>
-                  <a:schemeClr val="tx2"/>
-                </a:solidFill>
-              </a:rPr>
-              <a:t>	</a:t>
+              <a:t>		</a:t>
             </a:r>
             <a:r>
               <a:rPr lang="en-US" sz="1500" dirty="0">
@@ -4089,32 +3798,8 @@
                 </a:solidFill>
                 <a:latin typeface="Myriad Pro"/>
               </a:rPr>
-              <a:t>Slide credit: </a:t>
-            </a:r>
-            <a:r>
-              <a:rPr lang="en-US" sz="900" dirty="0">
-                <a:solidFill>
-                  <a:schemeClr val="tx2"/>
-                </a:solidFill>
-                <a:latin typeface="Myriad Pro"/>
-              </a:rPr>
-              <a:t>Joseph Gum (https://</a:t>
-            </a:r>
-            <a:r>
-              <a:rPr lang="en-US" sz="900" dirty="0">
-                <a:solidFill>
-                  <a:schemeClr val="tx2"/>
-                </a:solidFill>
-                <a:latin typeface="Myriad Pro"/>
-              </a:rPr>
-              <a:t>github.com/asx-)</a:t>
-            </a:r>
-            <a:endParaRPr lang="en-US" sz="900" dirty="0">
-              <a:solidFill>
-                <a:schemeClr val="tx2"/>
-              </a:solidFill>
-              <a:latin typeface="Myriad Pro"/>
-            </a:endParaRPr>
+              <a:t>Slide credit: Joseph Gum (https://github.com/asx-)</a:t>
+            </a:r>
           </a:p>
         </p:txBody>
       </p:sp>
@@ -4626,21 +4311,8 @@
                   <a:schemeClr val="tx2"/>
                 </a:solidFill>
               </a:rPr>
-              <a:t>N</a:t>
-            </a:r>
-            <a:r>
-              <a:rPr lang="en-US" sz="1500" dirty="0">
-                <a:solidFill>
-                  <a:schemeClr val="tx2"/>
-                </a:solidFill>
-              </a:rPr>
-              <a:t>eed sufficient detail about procedures and data so that the same procedures could be exactly repeated</a:t>
-            </a:r>
-            <a:endParaRPr lang="en-US" sz="1500" dirty="0">
-              <a:solidFill>
-                <a:schemeClr val="tx2"/>
-              </a:solidFill>
-            </a:endParaRPr>
+              <a:t>Need sufficient detail about procedures and data so that the same procedures could be exactly repeated</a:t>
+            </a:r>
           </a:p>
           <a:p>
             <a:r>
@@ -4664,11 +4336,6 @@
               </a:rPr>
               <a:t>Obtain the same results from an independent study with procedures as closely matched to the original study as possible</a:t>
             </a:r>
-            <a:endParaRPr lang="en-US" sz="1500" dirty="0">
-              <a:solidFill>
-                <a:schemeClr val="tx2"/>
-              </a:solidFill>
-            </a:endParaRPr>
           </a:p>
           <a:p>
             <a:r>
@@ -4724,32 +4391,8 @@
                 </a:solidFill>
                 <a:latin typeface="Myriad Pro"/>
               </a:rPr>
-              <a:t>Slide credit: </a:t>
-            </a:r>
-            <a:r>
-              <a:rPr lang="en-US" sz="900" dirty="0">
-                <a:solidFill>
-                  <a:schemeClr val="tx2"/>
-                </a:solidFill>
-                <a:latin typeface="Myriad Pro"/>
-              </a:rPr>
-              <a:t>Joseph Gum (https://</a:t>
-            </a:r>
-            <a:r>
-              <a:rPr lang="en-US" sz="900" dirty="0">
-                <a:solidFill>
-                  <a:schemeClr val="tx2"/>
-                </a:solidFill>
-                <a:latin typeface="Myriad Pro"/>
-              </a:rPr>
-              <a:t>github.com/asx-)</a:t>
-            </a:r>
-            <a:endParaRPr lang="en-US" sz="900" dirty="0">
-              <a:solidFill>
-                <a:schemeClr val="tx2"/>
-              </a:solidFill>
-              <a:latin typeface="Myriad Pro"/>
-            </a:endParaRPr>
+              <a:t>Slide credit: Joseph Gum (https://github.com/asx-)</a:t>
+            </a:r>
           </a:p>
         </p:txBody>
       </p:sp>
@@ -6159,11 +5802,7 @@
           <a:p>
             <a:r>
               <a:rPr lang="en-US" dirty="0" smtClean="0"/>
-              <a:t>Data </a:t>
-            </a:r>
-            <a:r>
-              <a:rPr lang="en-US" dirty="0" smtClean="0"/>
-              <a:t>organization for computers</a:t>
+              <a:t>Data organization for computers</a:t>
             </a:r>
             <a:endParaRPr lang="en-US" dirty="0"/>
           </a:p>
@@ -6202,11 +5841,6 @@
               </a:rPr>
               <a:t>What are the issues with this spreadsheet that could confuse R?</a:t>
             </a:r>
-            <a:endParaRPr lang="en-US" sz="1800" dirty="0">
-              <a:solidFill>
-                <a:schemeClr val="tx2"/>
-              </a:solidFill>
-            </a:endParaRPr>
           </a:p>
         </p:txBody>
       </p:sp>
@@ -6854,11 +6488,6 @@
               </a:rPr>
               <a:t>Need to store data in a universal, and static format e.g. .csv</a:t>
             </a:r>
-            <a:endParaRPr lang="en-US" sz="1800" b="1" dirty="0">
-              <a:solidFill>
-                <a:schemeClr val="tx2"/>
-              </a:solidFill>
-            </a:endParaRPr>
           </a:p>
         </p:txBody>
       </p:sp>
@@ -7200,6 +6829,13 @@
   <p:clrMapOvr>
     <a:masterClrMapping/>
   </p:clrMapOvr>
+  <p:timing>
+    <p:tnLst>
+      <p:par>
+        <p:cTn id="1" dur="indefinite" restart="never" nodeType="tmRoot"/>
+      </p:par>
+    </p:tnLst>
+  </p:timing>
 </p:sld>
 </file>
 
@@ -7230,7 +6866,12 @@
             <p:ph type="title"/>
           </p:nvPr>
         </p:nvSpPr>
-        <p:spPr/>
+        <p:spPr>
+          <a:xfrm>
+            <a:off x="430439" y="566683"/>
+            <a:ext cx="7886700" cy="733295"/>
+          </a:xfrm>
+        </p:spPr>
         <p:txBody>
           <a:bodyPr/>
           <a:lstStyle/>
@@ -7253,62 +6894,97 @@
             <p:ph idx="1"/>
           </p:nvPr>
         </p:nvSpPr>
-        <p:spPr/>
+        <p:spPr>
+          <a:xfrm>
+            <a:off x="430439" y="1427674"/>
+            <a:ext cx="8283121" cy="3572497"/>
+          </a:xfrm>
+        </p:spPr>
         <p:txBody>
           <a:bodyPr>
-            <a:normAutofit fontScale="92500" lnSpcReduction="10000"/>
+            <a:noAutofit/>
           </a:bodyPr>
           <a:lstStyle/>
           <a:p>
             <a:r>
-              <a:rPr lang="en-US" dirty="0" smtClean="0"/>
+              <a:rPr lang="en-US" sz="2200" dirty="0" smtClean="0"/>
               <a:t>Make figures:</a:t>
             </a:r>
           </a:p>
           <a:p>
             <a:pPr lvl="1"/>
             <a:r>
-              <a:rPr lang="en-US" dirty="0" smtClean="0"/>
-              <a:t>A</a:t>
-            </a:r>
+              <a:rPr lang="en-US" sz="2200" dirty="0" smtClean="0"/>
+              <a:t>A </a:t>
+            </a:r>
+            <a:r>
+              <a:rPr lang="en-US" sz="2200" dirty="0"/>
+              <a:t>temperature profile for Station 1 from the Cruise on Sept 11th </a:t>
+            </a:r>
+            <a:r>
+              <a:rPr lang="en-US" sz="2200" dirty="0" smtClean="0"/>
+              <a:t>2012</a:t>
+            </a:r>
+            <a:endParaRPr lang="en-US" sz="2200" dirty="0"/>
           </a:p>
           <a:p>
             <a:pPr lvl="1"/>
             <a:r>
-              <a:rPr lang="en-US" dirty="0" smtClean="0"/>
-              <a:t>A</a:t>
-            </a:r>
+              <a:rPr lang="en-US" sz="2200" dirty="0" smtClean="0"/>
+              <a:t>Temperature </a:t>
+            </a:r>
+            <a:r>
+              <a:rPr lang="en-US" sz="2200" dirty="0"/>
+              <a:t>profiles for all the Stations from the Cruise on Sept 11th 2012, with all profiles on the same plot</a:t>
+            </a:r>
+            <a:r>
+              <a:rPr lang="en-US" sz="2200" dirty="0" smtClean="0"/>
+              <a:t>.</a:t>
+            </a:r>
+            <a:endParaRPr lang="en-US" sz="2200" dirty="0"/>
           </a:p>
           <a:p>
             <a:pPr lvl="1"/>
             <a:r>
-              <a:rPr lang="en-US" dirty="0" smtClean="0"/>
-              <a:t>A</a:t>
-            </a:r>
-          </a:p>
-          <a:p>
-            <a:r>
-              <a:rPr lang="en-US" dirty="0" smtClean="0"/>
-              <a:t>Can either:</a:t>
+              <a:rPr lang="en-US" sz="2200" dirty="0" smtClean="0"/>
+              <a:t>Profiles </a:t>
+            </a:r>
+            <a:r>
+              <a:rPr lang="en-US" sz="2200" dirty="0"/>
+              <a:t>from all the stations for a cruise and variable of your </a:t>
+            </a:r>
+            <a:r>
+              <a:rPr lang="en-US" sz="2200" dirty="0" smtClean="0"/>
+              <a:t>choice.</a:t>
+            </a:r>
+          </a:p>
+          <a:p>
+            <a:r>
+              <a:rPr lang="en-US" sz="2200" dirty="0" smtClean="0"/>
+              <a:t>Can </a:t>
+            </a:r>
+            <a:r>
+              <a:rPr lang="en-US" sz="2200" dirty="0" smtClean="0"/>
+              <a:t>either:</a:t>
             </a:r>
           </a:p>
           <a:p>
             <a:pPr lvl="1"/>
             <a:r>
-              <a:rPr lang="en-US" dirty="0" smtClean="0"/>
+              <a:rPr lang="en-US" sz="2200" dirty="0" smtClean="0"/>
               <a:t>Follow along with me (includes installing R, getting orientated in R)</a:t>
             </a:r>
           </a:p>
           <a:p>
             <a:pPr lvl="1"/>
             <a:r>
-              <a:rPr lang="en-US" dirty="0" smtClean="0"/>
+              <a:rPr lang="en-US" sz="2200" dirty="0" smtClean="0"/>
               <a:t>Do it on your own and create a R Markdown file with your results</a:t>
             </a:r>
           </a:p>
           <a:p>
             <a:pPr lvl="1"/>
-            <a:endParaRPr lang="en-US" dirty="0"/>
+            <a:endParaRPr lang="en-US" sz="2200" dirty="0"/>
           </a:p>
         </p:txBody>
       </p:sp>
@@ -7322,6 +6998,13 @@
   <p:clrMapOvr>
     <a:masterClrMapping/>
   </p:clrMapOvr>
+  <p:timing>
+    <p:tnLst>
+      <p:par>
+        <p:cTn id="1" dur="indefinite" restart="never" nodeType="tmRoot"/>
+      </p:par>
+    </p:tnLst>
+  </p:timing>
 </p:sld>
 </file>
 

</xml_diff>